<commit_message>
antrittsvortrag wie gehalten mit notes
</commit_message>
<xml_diff>
--- a/Antrittsvortrag [Automatisch gespeichert].pptx
+++ b/Antrittsvortrag [Automatisch gespeichert].pptx
@@ -822,6 +822,442 @@
 </p:notes>
 </file>
 
+<file path=ppt/notesSlides/notesSlide10.xml><?xml version="1.0" encoding="utf-8"?>
+<p:notes xmlns:a="http://schemas.openxmlformats.org/drawingml/2006/main" xmlns:r="http://schemas.openxmlformats.org/officeDocument/2006/relationships" xmlns:p="http://schemas.openxmlformats.org/presentationml/2006/main">
+  <p:cSld>
+    <p:spTree>
+      <p:nvGrpSpPr>
+        <p:cNvPr id="1" name=""/>
+        <p:cNvGrpSpPr/>
+        <p:nvPr/>
+      </p:nvGrpSpPr>
+      <p:grpSpPr>
+        <a:xfrm>
+          <a:off x="0" y="0"/>
+          <a:ext cx="0" cy="0"/>
+          <a:chOff x="0" y="0"/>
+          <a:chExt cx="0" cy="0"/>
+        </a:xfrm>
+      </p:grpSpPr>
+      <p:sp>
+        <p:nvSpPr>
+          <p:cNvPr id="2" name="Folienbildplatzhalter 1"/>
+          <p:cNvSpPr>
+            <a:spLocks noGrp="1" noRot="1" noChangeAspect="1"/>
+          </p:cNvSpPr>
+          <p:nvPr>
+            <p:ph type="sldImg"/>
+          </p:nvPr>
+        </p:nvSpPr>
+        <p:spPr>
+          <a:xfrm>
+            <a:off x="381000" y="685800"/>
+            <a:ext cx="6096000" cy="3429000"/>
+          </a:xfrm>
+        </p:spPr>
+      </p:sp>
+      <p:sp>
+        <p:nvSpPr>
+          <p:cNvPr id="3" name="Notizenplatzhalter 2"/>
+          <p:cNvSpPr>
+            <a:spLocks noGrp="1"/>
+          </p:cNvSpPr>
+          <p:nvPr>
+            <p:ph type="body" idx="1"/>
+          </p:nvPr>
+        </p:nvSpPr>
+        <p:spPr/>
+        <p:txBody>
+          <a:bodyPr/>
+          <a:lstStyle/>
+          <a:p>
+            <a:r>
+              <a:rPr lang="de-DE" dirty="0"/>
+              <a:t>M5-Stack: 32bit Mikrocontroller mit </a:t>
+            </a:r>
+            <a:r>
+              <a:rPr lang="de-DE" dirty="0" err="1"/>
+              <a:t>gehäuse</a:t>
+            </a:r>
+            <a:r>
+              <a:rPr lang="de-DE" dirty="0"/>
+              <a:t> und </a:t>
+            </a:r>
+            <a:r>
+              <a:rPr lang="de-DE" dirty="0" err="1"/>
+              <a:t>display</a:t>
+            </a:r>
+            <a:endParaRPr lang="de-DE" dirty="0"/>
+          </a:p>
+        </p:txBody>
+      </p:sp>
+    </p:spTree>
+    <p:extLst>
+      <p:ext uri="{BB962C8B-B14F-4D97-AF65-F5344CB8AC3E}">
+        <p14:creationId xmlns:p14="http://schemas.microsoft.com/office/powerpoint/2010/main" val="185102740"/>
+      </p:ext>
+    </p:extLst>
+  </p:cSld>
+  <p:clrMapOvr>
+    <a:masterClrMapping/>
+  </p:clrMapOvr>
+</p:notes>
+</file>
+
+<file path=ppt/notesSlides/notesSlide11.xml><?xml version="1.0" encoding="utf-8"?>
+<p:notes xmlns:a="http://schemas.openxmlformats.org/drawingml/2006/main" xmlns:r="http://schemas.openxmlformats.org/officeDocument/2006/relationships" xmlns:p="http://schemas.openxmlformats.org/presentationml/2006/main">
+  <p:cSld>
+    <p:spTree>
+      <p:nvGrpSpPr>
+        <p:cNvPr id="1" name=""/>
+        <p:cNvGrpSpPr/>
+        <p:nvPr/>
+      </p:nvGrpSpPr>
+      <p:grpSpPr>
+        <a:xfrm>
+          <a:off x="0" y="0"/>
+          <a:ext cx="0" cy="0"/>
+          <a:chOff x="0" y="0"/>
+          <a:chExt cx="0" cy="0"/>
+        </a:xfrm>
+      </p:grpSpPr>
+      <p:sp>
+        <p:nvSpPr>
+          <p:cNvPr id="2" name="Folienbildplatzhalter 1"/>
+          <p:cNvSpPr>
+            <a:spLocks noGrp="1" noRot="1" noChangeAspect="1"/>
+          </p:cNvSpPr>
+          <p:nvPr>
+            <p:ph type="sldImg"/>
+          </p:nvPr>
+        </p:nvSpPr>
+        <p:spPr>
+          <a:xfrm>
+            <a:off x="381000" y="685800"/>
+            <a:ext cx="6096000" cy="3429000"/>
+          </a:xfrm>
+        </p:spPr>
+      </p:sp>
+      <p:sp>
+        <p:nvSpPr>
+          <p:cNvPr id="3" name="Notizenplatzhalter 2"/>
+          <p:cNvSpPr>
+            <a:spLocks noGrp="1"/>
+          </p:cNvSpPr>
+          <p:nvPr>
+            <p:ph type="body" idx="1"/>
+          </p:nvPr>
+        </p:nvSpPr>
+        <p:spPr/>
+        <p:txBody>
+          <a:bodyPr/>
+          <a:lstStyle/>
+          <a:p>
+            <a:r>
+              <a:rPr lang="de-DE" dirty="0"/>
+              <a:t>Warum </a:t>
+            </a:r>
+            <a:r>
+              <a:rPr lang="de-DE" dirty="0" err="1"/>
+              <a:t>photosorting</a:t>
+            </a:r>
+            <a:r>
+              <a:rPr lang="de-DE" dirty="0"/>
+              <a:t>? Wird oft verwendet für den vergleich traditionelle </a:t>
+            </a:r>
+            <a:r>
+              <a:rPr lang="de-DE" dirty="0" err="1"/>
+              <a:t>vs</a:t>
+            </a:r>
+            <a:r>
+              <a:rPr lang="de-DE" dirty="0"/>
+              <a:t> neue </a:t>
+            </a:r>
+            <a:r>
+              <a:rPr lang="de-DE" dirty="0" err="1"/>
+              <a:t>interaktion</a:t>
+            </a:r>
+            <a:r>
+              <a:rPr lang="de-DE" dirty="0"/>
+              <a:t>;</a:t>
+            </a:r>
+          </a:p>
+          <a:p>
+            <a:r>
+              <a:rPr lang="de-DE" dirty="0"/>
+              <a:t>Problem: </a:t>
+            </a:r>
+            <a:r>
+              <a:rPr lang="de-DE" dirty="0" err="1"/>
+              <a:t>reproduzierbarkeit</a:t>
+            </a:r>
+            <a:r>
+              <a:rPr lang="de-DE" dirty="0"/>
+              <a:t>; unterschiedlich große </a:t>
+            </a:r>
+            <a:r>
+              <a:rPr lang="de-DE" dirty="0" err="1"/>
+              <a:t>sets</a:t>
+            </a:r>
+            <a:r>
+              <a:rPr lang="de-DE" dirty="0"/>
+              <a:t>, mitgebrachte </a:t>
+            </a:r>
+            <a:r>
+              <a:rPr lang="de-DE" dirty="0" err="1"/>
+              <a:t>sets</a:t>
+            </a:r>
+            <a:r>
+              <a:rPr lang="de-DE" dirty="0"/>
+              <a:t> der </a:t>
+            </a:r>
+            <a:r>
+              <a:rPr lang="de-DE" dirty="0" err="1"/>
+              <a:t>teilnehmer</a:t>
+            </a:r>
+            <a:r>
+              <a:rPr lang="de-DE" dirty="0"/>
+              <a:t>, unterschiedliche </a:t>
+            </a:r>
+            <a:r>
+              <a:rPr lang="de-DE" dirty="0" err="1"/>
+              <a:t>kategorien</a:t>
+            </a:r>
+            <a:endParaRPr lang="de-DE" dirty="0"/>
+          </a:p>
+          <a:p>
+            <a:pPr marL="457200" indent="-298450">
+              <a:buFont typeface="Wingdings" panose="05000000000000000000" pitchFamily="2" charset="2"/>
+              <a:buChar char="à"/>
+            </a:pPr>
+            <a:r>
+              <a:rPr lang="de-DE" dirty="0" err="1">
+                <a:sym typeface="Wingdings" panose="05000000000000000000" pitchFamily="2" charset="2"/>
+              </a:rPr>
+              <a:t>Photoset</a:t>
+            </a:r>
+            <a:r>
+              <a:rPr lang="de-DE" dirty="0">
+                <a:sym typeface="Wingdings" panose="05000000000000000000" pitchFamily="2" charset="2"/>
+              </a:rPr>
+              <a:t> mit reproduzierbaren </a:t>
+            </a:r>
+            <a:r>
+              <a:rPr lang="de-DE" dirty="0" err="1">
+                <a:sym typeface="Wingdings" panose="05000000000000000000" pitchFamily="2" charset="2"/>
+              </a:rPr>
+              <a:t>ergebnissen</a:t>
+            </a:r>
+            <a:endParaRPr lang="de-DE" dirty="0">
+              <a:sym typeface="Wingdings" panose="05000000000000000000" pitchFamily="2" charset="2"/>
+            </a:endParaRPr>
+          </a:p>
+          <a:p>
+            <a:pPr marL="457200" indent="-298450">
+              <a:buFont typeface="Wingdings" panose="05000000000000000000" pitchFamily="2" charset="2"/>
+              <a:buChar char="à"/>
+            </a:pPr>
+            <a:endParaRPr lang="de-DE" dirty="0"/>
+          </a:p>
+          <a:p>
+            <a:r>
+              <a:rPr lang="de-DE" dirty="0" err="1"/>
+              <a:t>Within</a:t>
+            </a:r>
+            <a:r>
+              <a:rPr lang="de-DE" dirty="0"/>
+              <a:t> </a:t>
+            </a:r>
+            <a:r>
+              <a:rPr lang="de-DE" dirty="0" err="1"/>
+              <a:t>subject</a:t>
+            </a:r>
+            <a:r>
+              <a:rPr lang="de-DE" dirty="0"/>
+              <a:t> weil solidere Daten, </a:t>
+            </a:r>
+            <a:r>
+              <a:rPr lang="de-DE" dirty="0" err="1"/>
+              <a:t>einfluss</a:t>
+            </a:r>
+            <a:r>
+              <a:rPr lang="de-DE" dirty="0"/>
+              <a:t> von </a:t>
+            </a:r>
+            <a:r>
+              <a:rPr lang="de-DE" dirty="0" err="1"/>
+              <a:t>anchoring</a:t>
+            </a:r>
+            <a:r>
+              <a:rPr lang="de-DE" dirty="0"/>
+              <a:t> des ersten </a:t>
+            </a:r>
+            <a:r>
+              <a:rPr lang="de-DE" dirty="0" err="1"/>
+              <a:t>durchlaufs</a:t>
+            </a:r>
+            <a:r>
+              <a:rPr lang="de-DE" dirty="0"/>
+              <a:t>?, direkte </a:t>
+            </a:r>
+            <a:r>
+              <a:rPr lang="de-DE" dirty="0" err="1"/>
+              <a:t>präferenzen</a:t>
+            </a:r>
+            <a:r>
+              <a:rPr lang="de-DE" dirty="0"/>
+              <a:t>, vergleich der </a:t>
+            </a:r>
+            <a:r>
+              <a:rPr lang="de-DE" dirty="0" err="1"/>
+              <a:t>cognitive</a:t>
+            </a:r>
+            <a:r>
+              <a:rPr lang="de-DE" dirty="0"/>
+              <a:t> </a:t>
+            </a:r>
+            <a:r>
+              <a:rPr lang="de-DE" dirty="0" err="1"/>
+              <a:t>load</a:t>
+            </a:r>
+            <a:endParaRPr lang="de-DE" dirty="0"/>
+          </a:p>
+          <a:p>
+            <a:r>
+              <a:rPr lang="de-DE" dirty="0"/>
+              <a:t>Interview aufgeteilt zur </a:t>
+            </a:r>
+            <a:r>
+              <a:rPr lang="de-DE" dirty="0" err="1"/>
+              <a:t>entlastung</a:t>
+            </a:r>
+            <a:r>
+              <a:rPr lang="de-DE" dirty="0"/>
+              <a:t> des </a:t>
+            </a:r>
+            <a:r>
+              <a:rPr lang="de-DE" dirty="0" err="1"/>
+              <a:t>kurzzeitgedächtnisses</a:t>
+            </a:r>
+            <a:r>
+              <a:rPr lang="de-DE" dirty="0"/>
+              <a:t>. Guter plan? Schlechter plan?</a:t>
+            </a:r>
+          </a:p>
+          <a:p>
+            <a:r>
+              <a:rPr lang="de-DE" dirty="0" err="1"/>
+              <a:t>Nasa</a:t>
+            </a:r>
+            <a:r>
+              <a:rPr lang="de-DE" dirty="0"/>
+              <a:t> TLX 1x oder 2x</a:t>
+            </a:r>
+          </a:p>
+          <a:p>
+            <a:r>
+              <a:rPr lang="de-DE" dirty="0"/>
+              <a:t>Video, </a:t>
+            </a:r>
+            <a:r>
+              <a:rPr lang="de-DE" dirty="0" err="1"/>
+              <a:t>interviews</a:t>
+            </a:r>
+            <a:r>
+              <a:rPr lang="de-DE" dirty="0"/>
+              <a:t> und logs zur </a:t>
+            </a:r>
+            <a:r>
+              <a:rPr lang="de-DE" dirty="0" err="1"/>
+              <a:t>bestimmung</a:t>
+            </a:r>
+            <a:r>
+              <a:rPr lang="de-DE" dirty="0"/>
+              <a:t> von </a:t>
+            </a:r>
+            <a:r>
+              <a:rPr lang="de-DE" dirty="0" err="1"/>
+              <a:t>strategien</a:t>
+            </a:r>
+            <a:r>
+              <a:rPr lang="de-DE" dirty="0"/>
+              <a:t>, </a:t>
+            </a:r>
+            <a:r>
+              <a:rPr lang="de-DE" dirty="0" err="1"/>
+              <a:t>nasatlx</a:t>
+            </a:r>
+            <a:r>
+              <a:rPr lang="de-DE" dirty="0"/>
+              <a:t> und </a:t>
+            </a:r>
+            <a:r>
+              <a:rPr lang="de-DE" dirty="0" err="1"/>
+              <a:t>interviews</a:t>
+            </a:r>
+            <a:r>
+              <a:rPr lang="de-DE" dirty="0"/>
+              <a:t> zur </a:t>
+            </a:r>
+            <a:r>
+              <a:rPr lang="de-DE" dirty="0" err="1"/>
+              <a:t>bewertung</a:t>
+            </a:r>
+            <a:r>
+              <a:rPr lang="de-DE" dirty="0"/>
+              <a:t> von </a:t>
+            </a:r>
+            <a:r>
+              <a:rPr lang="de-DE" dirty="0" err="1"/>
+              <a:t>strategien</a:t>
+            </a:r>
+            <a:endParaRPr lang="de-DE" dirty="0"/>
+          </a:p>
+          <a:p>
+            <a:pPr marL="158750" indent="0">
+              <a:buNone/>
+            </a:pPr>
+            <a:r>
+              <a:rPr lang="de-DE" dirty="0">
+                <a:sym typeface="Wingdings" panose="05000000000000000000" pitchFamily="2" charset="2"/>
+              </a:rPr>
+              <a:t> Strategien bestimmen aufgrund vom vorgehen, </a:t>
+            </a:r>
+            <a:r>
+              <a:rPr lang="de-DE" dirty="0" err="1">
+                <a:sym typeface="Wingdings" panose="05000000000000000000" pitchFamily="2" charset="2"/>
+              </a:rPr>
+              <a:t>händigkeit</a:t>
+            </a:r>
+            <a:r>
+              <a:rPr lang="de-DE" dirty="0">
+                <a:sym typeface="Wingdings" panose="05000000000000000000" pitchFamily="2" charset="2"/>
+              </a:rPr>
+              <a:t>, </a:t>
+            </a:r>
+            <a:r>
+              <a:rPr lang="de-DE" dirty="0" err="1">
+                <a:sym typeface="Wingdings" panose="05000000000000000000" pitchFamily="2" charset="2"/>
+              </a:rPr>
+              <a:t>prioritäten</a:t>
+            </a:r>
+            <a:endParaRPr lang="de-DE" dirty="0"/>
+          </a:p>
+        </p:txBody>
+      </p:sp>
+    </p:spTree>
+    <p:extLst>
+      <p:ext uri="{BB962C8B-B14F-4D97-AF65-F5344CB8AC3E}">
+        <p14:creationId xmlns:p14="http://schemas.microsoft.com/office/powerpoint/2010/main" val="4044334140"/>
+      </p:ext>
+    </p:extLst>
+  </p:cSld>
+  <p:clrMapOvr>
+    <a:masterClrMapping/>
+  </p:clrMapOvr>
+</p:notes>
+</file>
+
 <file path=ppt/notesSlides/notesSlide2.xml><?xml version="1.0" encoding="utf-8"?>
 <p:notes xmlns:a="http://schemas.openxmlformats.org/drawingml/2006/main" xmlns:r="http://schemas.openxmlformats.org/officeDocument/2006/relationships" xmlns:p="http://schemas.openxmlformats.org/presentationml/2006/main" showMasterSp="0" showMasterPhAnim="0">
   <p:cSld>
@@ -1020,6 +1456,45 @@
             </a:pPr>
             <a:r>
               <a:rPr lang="de-DE" dirty="0"/>
+              <a:t>Tangible = (</a:t>
+            </a:r>
+            <a:r>
+              <a:rPr lang="de-DE" dirty="0" err="1"/>
+              <a:t>be</a:t>
+            </a:r>
+            <a:r>
+              <a:rPr lang="de-DE" dirty="0"/>
+              <a:t>-)greifbare </a:t>
+            </a:r>
+            <a:r>
+              <a:rPr lang="de-DE" dirty="0" err="1"/>
+              <a:t>interaktion</a:t>
+            </a:r>
+            <a:r>
+              <a:rPr lang="de-DE" dirty="0"/>
+              <a:t>, geht zurück auf </a:t>
+            </a:r>
+            <a:r>
+              <a:rPr lang="de-DE" dirty="0" err="1"/>
+              <a:t>hitori</a:t>
+            </a:r>
+            <a:r>
+              <a:rPr lang="de-DE" dirty="0"/>
+              <a:t> Ishii</a:t>
+            </a:r>
+          </a:p>
+          <a:p>
+            <a:pPr marL="0" lvl="0" indent="0" algn="l" rtl="0">
+              <a:spcBef>
+                <a:spcPts val="0"/>
+              </a:spcBef>
+              <a:spcAft>
+                <a:spcPts val="0"/>
+              </a:spcAft>
+              <a:buNone/>
+            </a:pPr>
+            <a:r>
+              <a:rPr lang="de-DE" dirty="0"/>
               <a:t>Heißt effektiv: Vergleich von einem Tangible mit multiplen </a:t>
             </a:r>
             <a:r>
@@ -1056,11 +1531,11 @@
 </file>
 
 <file path=ppt/notesSlides/notesSlide4.xml><?xml version="1.0" encoding="utf-8"?>
-<p:notes xmlns:a="http://schemas.openxmlformats.org/drawingml/2006/main" xmlns:r="http://schemas.openxmlformats.org/officeDocument/2006/relationships" xmlns:p="http://schemas.openxmlformats.org/presentationml/2006/main" showMasterSp="0" showMasterPhAnim="0">
+<p:notes xmlns:a="http://schemas.openxmlformats.org/drawingml/2006/main" xmlns:r="http://schemas.openxmlformats.org/officeDocument/2006/relationships" xmlns:p="http://schemas.openxmlformats.org/presentationml/2006/main">
   <p:cSld>
     <p:spTree>
       <p:nvGrpSpPr>
-        <p:cNvPr id="1" name="Shape 295"/>
+        <p:cNvPr id="1" name=""/>
         <p:cNvGrpSpPr/>
         <p:nvPr/>
       </p:nvGrpSpPr>
@@ -1074,12 +1549,12 @@
       </p:grpSpPr>
       <p:sp>
         <p:nvSpPr>
-          <p:cNvPr id="296" name="Google Shape;296;g5e8018bd06_4_51:notes"/>
+          <p:cNvPr id="2" name="Folienbildplatzhalter 1"/>
           <p:cNvSpPr>
             <a:spLocks noGrp="1" noRot="1" noChangeAspect="1"/>
           </p:cNvSpPr>
           <p:nvPr>
-            <p:ph type="sldImg" idx="2"/>
+            <p:ph type="sldImg"/>
           </p:nvPr>
         </p:nvSpPr>
         <p:spPr>
@@ -1087,74 +1562,42 @@
             <a:off x="381000" y="685800"/>
             <a:ext cx="6096000" cy="3429000"/>
           </a:xfrm>
-          <a:custGeom>
-            <a:avLst/>
-            <a:gdLst/>
-            <a:ahLst/>
-            <a:cxnLst/>
-            <a:rect l="l" t="t" r="r" b="b"/>
-            <a:pathLst>
-              <a:path w="120000" h="120000" extrusionOk="0">
-                <a:moveTo>
-                  <a:pt x="0" y="0"/>
-                </a:moveTo>
-                <a:lnTo>
-                  <a:pt x="120000" y="0"/>
-                </a:lnTo>
-                <a:lnTo>
-                  <a:pt x="120000" y="120000"/>
-                </a:lnTo>
-                <a:lnTo>
-                  <a:pt x="0" y="120000"/>
-                </a:lnTo>
-                <a:close/>
-              </a:path>
-            </a:pathLst>
-          </a:custGeom>
         </p:spPr>
       </p:sp>
       <p:sp>
         <p:nvSpPr>
-          <p:cNvPr id="297" name="Google Shape;297;g5e8018bd06_4_51:notes"/>
-          <p:cNvSpPr txBox="1">
+          <p:cNvPr id="3" name="Notizenplatzhalter 2"/>
+          <p:cNvSpPr>
             <a:spLocks noGrp="1"/>
           </p:cNvSpPr>
           <p:nvPr>
             <p:ph type="body" idx="1"/>
           </p:nvPr>
         </p:nvSpPr>
-        <p:spPr>
-          <a:xfrm>
-            <a:off x="685800" y="4343400"/>
-            <a:ext cx="5486400" cy="4114800"/>
-          </a:xfrm>
-          <a:prstGeom prst="rect">
-            <a:avLst/>
-          </a:prstGeom>
-        </p:spPr>
+        <p:spPr/>
         <p:txBody>
-          <a:bodyPr spcFirstLastPara="1" wrap="square" lIns="91425" tIns="91425" rIns="91425" bIns="91425" anchor="t" anchorCtr="0">
-            <a:noAutofit/>
-          </a:bodyPr>
+          <a:bodyPr/>
           <a:lstStyle/>
           <a:p>
-            <a:pPr marL="0" lvl="0" indent="0" algn="l" rtl="0">
-              <a:spcBef>
-                <a:spcPts val="0"/>
-              </a:spcBef>
-              <a:spcAft>
-                <a:spcPts val="0"/>
-              </a:spcAft>
-              <a:buNone/>
-            </a:pPr>
-            <a:endParaRPr dirty="0"/>
+            <a:r>
+              <a:rPr lang="de-DE" dirty="0"/>
+              <a:t>(Bei gleicher </a:t>
+            </a:r>
+            <a:r>
+              <a:rPr lang="de-DE" dirty="0" err="1"/>
+              <a:t>funktionalität</a:t>
+            </a:r>
+            <a:r>
+              <a:rPr lang="de-DE" dirty="0"/>
+              <a:t>)</a:t>
+            </a:r>
           </a:p>
         </p:txBody>
       </p:sp>
     </p:spTree>
     <p:extLst>
       <p:ext uri="{BB962C8B-B14F-4D97-AF65-F5344CB8AC3E}">
-        <p14:creationId xmlns:p14="http://schemas.microsoft.com/office/powerpoint/2010/main" val="290983725"/>
+        <p14:creationId xmlns:p14="http://schemas.microsoft.com/office/powerpoint/2010/main" val="2020704677"/>
       </p:ext>
     </p:extLst>
   </p:cSld>
@@ -1258,31 +1701,7 @@
             </a:pPr>
             <a:r>
               <a:rPr lang="de-DE" dirty="0" err="1"/>
-              <a:t>Tuddenham</a:t>
-            </a:r>
-            <a:r>
-              <a:rPr lang="de-DE" dirty="0"/>
-              <a:t>: Touch </a:t>
-            </a:r>
-            <a:r>
-              <a:rPr lang="de-DE" dirty="0" err="1"/>
-              <a:t>vs</a:t>
-            </a:r>
-            <a:r>
-              <a:rPr lang="de-DE" dirty="0"/>
-              <a:t> GUI </a:t>
-            </a:r>
-            <a:r>
-              <a:rPr lang="de-DE" dirty="0" err="1"/>
-              <a:t>vs</a:t>
-            </a:r>
-            <a:r>
-              <a:rPr lang="de-DE" dirty="0"/>
-              <a:t> TUI; </a:t>
-            </a:r>
-            <a:r>
-              <a:rPr lang="de-DE" dirty="0" err="1"/>
-              <a:t>manipulations</a:t>
+              <a:t>Tinguy</a:t>
             </a:r>
             <a:r>
               <a:rPr lang="de-DE" dirty="0"/>
@@ -1290,213 +1709,98 @@
             </a:r>
             <a:r>
               <a:rPr lang="de-DE" dirty="0" err="1"/>
-              <a:t>acquisition</a:t>
+              <a:t>kollegen</a:t>
             </a:r>
             <a:r>
               <a:rPr lang="de-DE" dirty="0"/>
-              <a:t> </a:t>
+              <a:t>: Unterstützung von VR durch tangibles, </a:t>
             </a:r>
             <a:r>
               <a:rPr lang="de-DE" dirty="0" err="1"/>
-              <a:t>task</a:t>
+              <a:t>untersuchung</a:t>
             </a:r>
             <a:r>
               <a:rPr lang="de-DE" dirty="0"/>
-              <a:t>; TUI </a:t>
+              <a:t> wie ähnlich sie sich sein müssen</a:t>
+            </a:r>
+          </a:p>
+          <a:p>
+            <a:pPr marL="0" lvl="0" indent="0" algn="l" rtl="0">
+              <a:spcBef>
+                <a:spcPts val="0"/>
+              </a:spcBef>
+              <a:spcAft>
+                <a:spcPts val="0"/>
+              </a:spcAft>
+              <a:buNone/>
+            </a:pPr>
+            <a:r>
+              <a:rPr lang="de-DE" dirty="0"/>
+              <a:t>Sullivan </a:t>
             </a:r>
             <a:r>
               <a:rPr lang="de-DE" dirty="0" err="1"/>
-              <a:t>deemed</a:t>
+              <a:t>Bers</a:t>
             </a:r>
             <a:r>
               <a:rPr lang="de-DE" dirty="0"/>
-              <a:t> </a:t>
+              <a:t> und Mihm, KIBO: gleich mehr</a:t>
+            </a:r>
+          </a:p>
+          <a:p>
+            <a:pPr marL="0" lvl="0" indent="0" algn="l" rtl="0">
+              <a:spcBef>
+                <a:spcPts val="0"/>
+              </a:spcBef>
+              <a:spcAft>
+                <a:spcPts val="0"/>
+              </a:spcAft>
+              <a:buNone/>
+            </a:pPr>
+            <a:r>
+              <a:rPr lang="de-DE" dirty="0"/>
+              <a:t>Tam und Kollegen, </a:t>
             </a:r>
             <a:r>
               <a:rPr lang="de-DE" dirty="0" err="1"/>
-              <a:t>best</a:t>
+              <a:t>Polipo</a:t>
             </a:r>
             <a:r>
               <a:rPr lang="de-DE" dirty="0"/>
-              <a:t> </a:t>
+              <a:t>: für </a:t>
             </a:r>
             <a:r>
               <a:rPr lang="de-DE" dirty="0" err="1"/>
-              <a:t>for</a:t>
+              <a:t>kinder</a:t>
             </a:r>
             <a:r>
               <a:rPr lang="de-DE" dirty="0"/>
-              <a:t> </a:t>
+              <a:t> mit </a:t>
             </a:r>
             <a:r>
               <a:rPr lang="de-DE" dirty="0" err="1"/>
-              <a:t>the</a:t>
+              <a:t>neuroentwichlungsstörungen</a:t>
             </a:r>
             <a:r>
               <a:rPr lang="de-DE" dirty="0"/>
-              <a:t> </a:t>
+              <a:t>; sinn: </a:t>
             </a:r>
             <a:r>
               <a:rPr lang="de-DE" dirty="0" err="1"/>
-              <a:t>task</a:t>
+              <a:t>feinmotorikentwicklung</a:t>
             </a:r>
             <a:r>
               <a:rPr lang="de-DE" dirty="0"/>
-              <a:t>; Beobachten ein und beidhändige </a:t>
-            </a:r>
-            <a:r>
-              <a:rPr lang="de-DE" dirty="0" err="1"/>
-              <a:t>interaktion</a:t>
-            </a:r>
-            <a:r>
-              <a:rPr lang="de-DE" dirty="0"/>
-              <a:t>, sowie „gleichzeitige einhändige </a:t>
-            </a:r>
-            <a:r>
-              <a:rPr lang="de-DE" dirty="0" err="1"/>
-              <a:t>interaktion</a:t>
-            </a:r>
-            <a:r>
-              <a:rPr lang="de-DE" dirty="0"/>
-              <a:t>“</a:t>
-            </a:r>
-          </a:p>
-          <a:p>
-            <a:pPr marL="0" lvl="0" indent="0" algn="l" rtl="0">
-              <a:spcBef>
-                <a:spcPts val="0"/>
-              </a:spcBef>
-              <a:spcAft>
-                <a:spcPts val="0"/>
-              </a:spcAft>
-              <a:buNone/>
-            </a:pPr>
-            <a:r>
-              <a:rPr lang="de-DE" dirty="0" err="1"/>
-              <a:t>Zuckerman</a:t>
-            </a:r>
-            <a:r>
-              <a:rPr lang="de-DE" dirty="0"/>
-              <a:t>: vergleich GUI TUI für in </a:t>
-            </a:r>
-            <a:r>
-              <a:rPr lang="de-DE" dirty="0" err="1"/>
-              <a:t>depth</a:t>
-            </a:r>
-            <a:r>
-              <a:rPr lang="de-DE" dirty="0"/>
-              <a:t> </a:t>
-            </a:r>
-            <a:r>
-              <a:rPr lang="de-DE" dirty="0" err="1"/>
-              <a:t>analyse</a:t>
-            </a:r>
-            <a:r>
-              <a:rPr lang="de-DE" dirty="0"/>
-              <a:t>, aber: auf eigener </a:t>
-            </a:r>
-            <a:r>
-              <a:rPr lang="de-DE" dirty="0" err="1"/>
-              <a:t>software</a:t>
-            </a:r>
-            <a:r>
-              <a:rPr lang="de-DE" dirty="0"/>
-              <a:t> für spezielle </a:t>
-            </a:r>
-            <a:r>
-              <a:rPr lang="de-DE" dirty="0" err="1"/>
-              <a:t>interaktion</a:t>
-            </a:r>
-            <a:r>
-              <a:rPr lang="de-DE" dirty="0"/>
-              <a:t>; GUI bessere Usability, TUI präferiert;  Liste 11 vorheriger arbeiten im </a:t>
-            </a:r>
-            <a:r>
-              <a:rPr lang="de-DE" dirty="0" err="1"/>
-              <a:t>bereich</a:t>
-            </a:r>
-            <a:r>
-              <a:rPr lang="de-DE" dirty="0"/>
-              <a:t> und kein vergleich </a:t>
-            </a:r>
-            <a:r>
-              <a:rPr lang="de-DE" dirty="0" err="1"/>
-              <a:t>Tui</a:t>
-            </a:r>
-            <a:r>
-              <a:rPr lang="de-DE" dirty="0"/>
-              <a:t> </a:t>
-            </a:r>
-            <a:r>
-              <a:rPr lang="de-DE" dirty="0" err="1"/>
-              <a:t>Tui</a:t>
-            </a:r>
-            <a:r>
-              <a:rPr lang="de-DE" dirty="0"/>
-              <a:t> gelistet</a:t>
-            </a:r>
-          </a:p>
-          <a:p>
-            <a:pPr marL="0" lvl="0" indent="0" algn="l" rtl="0">
-              <a:spcBef>
-                <a:spcPts val="0"/>
-              </a:spcBef>
-              <a:spcAft>
-                <a:spcPts val="0"/>
-              </a:spcAft>
-              <a:buNone/>
-            </a:pPr>
-            <a:r>
-              <a:rPr lang="de-DE" dirty="0"/>
-              <a:t>Ma et al: Interaktion auf </a:t>
-            </a:r>
-            <a:r>
-              <a:rPr lang="de-DE" dirty="0" err="1"/>
-              <a:t>museumstischen</a:t>
-            </a:r>
-            <a:r>
-              <a:rPr lang="de-DE" dirty="0"/>
-              <a:t>, entweder </a:t>
-            </a:r>
-            <a:r>
-              <a:rPr lang="de-DE" dirty="0" err="1"/>
-              <a:t>software</a:t>
-            </a:r>
-            <a:r>
-              <a:rPr lang="de-DE" dirty="0"/>
-              <a:t> gerenderter ring oder aufgelegter </a:t>
-            </a:r>
-            <a:r>
-              <a:rPr lang="de-DE" dirty="0" err="1"/>
-              <a:t>holzringTUI</a:t>
-            </a:r>
-            <a:r>
-              <a:rPr lang="de-DE" dirty="0"/>
-              <a:t> </a:t>
-            </a:r>
-            <a:r>
-              <a:rPr lang="de-DE" dirty="0" err="1"/>
-              <a:t>affordet</a:t>
-            </a:r>
-            <a:r>
-              <a:rPr lang="de-DE" dirty="0"/>
-              <a:t> berühren und manipulieren besser, keine signifikanten </a:t>
-            </a:r>
-            <a:r>
-              <a:rPr lang="de-DE" dirty="0" err="1"/>
-              <a:t>ergebnisse</a:t>
-            </a:r>
-            <a:r>
-              <a:rPr lang="de-DE" dirty="0"/>
-              <a:t> außerhalb davon</a:t>
-            </a:r>
+              <a:t> unterstützen</a:t>
+            </a:r>
+            <a:endParaRPr dirty="0"/>
           </a:p>
         </p:txBody>
       </p:sp>
     </p:spTree>
     <p:extLst>
       <p:ext uri="{BB962C8B-B14F-4D97-AF65-F5344CB8AC3E}">
-        <p14:creationId xmlns:p14="http://schemas.microsoft.com/office/powerpoint/2010/main" val="3548629303"/>
+        <p14:creationId xmlns:p14="http://schemas.microsoft.com/office/powerpoint/2010/main" val="290983725"/>
       </p:ext>
     </p:extLst>
   </p:cSld>
@@ -1507,6 +1811,88 @@
 </file>
 
 <file path=ppt/notesSlides/notesSlide6.xml><?xml version="1.0" encoding="utf-8"?>
+<p:notes xmlns:a="http://schemas.openxmlformats.org/drawingml/2006/main" xmlns:r="http://schemas.openxmlformats.org/officeDocument/2006/relationships" xmlns:p="http://schemas.openxmlformats.org/presentationml/2006/main">
+  <p:cSld>
+    <p:spTree>
+      <p:nvGrpSpPr>
+        <p:cNvPr id="1" name=""/>
+        <p:cNvGrpSpPr/>
+        <p:nvPr/>
+      </p:nvGrpSpPr>
+      <p:grpSpPr>
+        <a:xfrm>
+          <a:off x="0" y="0"/>
+          <a:ext cx="0" cy="0"/>
+          <a:chOff x="0" y="0"/>
+          <a:chExt cx="0" cy="0"/>
+        </a:xfrm>
+      </p:grpSpPr>
+      <p:sp>
+        <p:nvSpPr>
+          <p:cNvPr id="2" name="Folienbildplatzhalter 1"/>
+          <p:cNvSpPr>
+            <a:spLocks noGrp="1" noRot="1" noChangeAspect="1"/>
+          </p:cNvSpPr>
+          <p:nvPr>
+            <p:ph type="sldImg"/>
+          </p:nvPr>
+        </p:nvSpPr>
+        <p:spPr>
+          <a:xfrm>
+            <a:off x="381000" y="685800"/>
+            <a:ext cx="6096000" cy="3429000"/>
+          </a:xfrm>
+        </p:spPr>
+      </p:sp>
+      <p:sp>
+        <p:nvSpPr>
+          <p:cNvPr id="3" name="Notizenplatzhalter 2"/>
+          <p:cNvSpPr>
+            <a:spLocks noGrp="1"/>
+          </p:cNvSpPr>
+          <p:nvPr>
+            <p:ph type="body" idx="1"/>
+          </p:nvPr>
+        </p:nvSpPr>
+        <p:spPr/>
+        <p:txBody>
+          <a:bodyPr/>
+          <a:lstStyle/>
+          <a:p>
+            <a:r>
+              <a:rPr lang="de-DE" dirty="0"/>
+              <a:t>Physische </a:t>
+            </a:r>
+            <a:r>
+              <a:rPr lang="de-DE" dirty="0" err="1"/>
+              <a:t>blöcke</a:t>
+            </a:r>
+            <a:r>
+              <a:rPr lang="de-DE" dirty="0"/>
+              <a:t> steuern tatsächlich </a:t>
+            </a:r>
+            <a:r>
+              <a:rPr lang="de-DE" dirty="0" err="1"/>
+              <a:t>roboter</a:t>
+            </a:r>
+            <a:endParaRPr lang="de-DE" dirty="0"/>
+          </a:p>
+        </p:txBody>
+      </p:sp>
+    </p:spTree>
+    <p:extLst>
+      <p:ext uri="{BB962C8B-B14F-4D97-AF65-F5344CB8AC3E}">
+        <p14:creationId xmlns:p14="http://schemas.microsoft.com/office/powerpoint/2010/main" val="4211444264"/>
+      </p:ext>
+    </p:extLst>
+  </p:cSld>
+  <p:clrMapOvr>
+    <a:masterClrMapping/>
+  </p:clrMapOvr>
+</p:notes>
+</file>
+
+<file path=ppt/notesSlides/notesSlide7.xml><?xml version="1.0" encoding="utf-8"?>
 <p:notes xmlns:a="http://schemas.openxmlformats.org/drawingml/2006/main" xmlns:r="http://schemas.openxmlformats.org/officeDocument/2006/relationships" xmlns:p="http://schemas.openxmlformats.org/presentationml/2006/main" showMasterSp="0" showMasterPhAnim="0">
   <p:cSld>
     <p:spTree>
@@ -1599,12 +1985,40 @@
               <a:buNone/>
             </a:pPr>
             <a:r>
+              <a:rPr lang="de-DE" dirty="0" err="1"/>
+              <a:t>Tuddenham</a:t>
+            </a:r>
+            <a:r>
               <a:rPr lang="de-DE" dirty="0"/>
-              <a:t>Fokus auf </a:t>
+              <a:t>: Touch </a:t>
             </a:r>
             <a:r>
               <a:rPr lang="de-DE" dirty="0" err="1"/>
-              <a:t>one-handed</a:t>
+              <a:t>vs</a:t>
+            </a:r>
+            <a:r>
+              <a:rPr lang="de-DE" dirty="0"/>
+              <a:t> GUI </a:t>
+            </a:r>
+            <a:r>
+              <a:rPr lang="de-DE" dirty="0" err="1"/>
+              <a:t>vs</a:t>
+            </a:r>
+            <a:r>
+              <a:rPr lang="de-DE" dirty="0"/>
+              <a:t> TUI; </a:t>
+            </a:r>
+            <a:r>
+              <a:rPr lang="de-DE" dirty="0" err="1"/>
+              <a:t>manipulations</a:t>
+            </a:r>
+            <a:r>
+              <a:rPr lang="de-DE" dirty="0"/>
+              <a:t> und </a:t>
+            </a:r>
+            <a:r>
+              <a:rPr lang="de-DE" dirty="0" err="1"/>
+              <a:t>acquisition</a:t>
             </a:r>
             <a:r>
               <a:rPr lang="de-DE" dirty="0"/>
@@ -1612,7 +2026,15 @@
             </a:r>
             <a:r>
               <a:rPr lang="de-DE" dirty="0" err="1"/>
-              <a:t>vs</a:t>
+              <a:t>task</a:t>
+            </a:r>
+            <a:r>
+              <a:rPr lang="de-DE" dirty="0"/>
+              <a:t>; TUI </a:t>
+            </a:r>
+            <a:r>
+              <a:rPr lang="de-DE" dirty="0" err="1"/>
+              <a:t>deemed</a:t>
             </a:r>
             <a:r>
               <a:rPr lang="de-DE" dirty="0"/>
@@ -1620,7 +2042,7 @@
             </a:r>
             <a:r>
               <a:rPr lang="de-DE" dirty="0" err="1"/>
-              <a:t>two</a:t>
+              <a:t>best</a:t>
             </a:r>
             <a:r>
               <a:rPr lang="de-DE" dirty="0"/>
@@ -1628,11 +2050,19 @@
             </a:r>
             <a:r>
               <a:rPr lang="de-DE" dirty="0" err="1"/>
-              <a:t>handed</a:t>
+              <a:t>for</a:t>
             </a:r>
             <a:r>
               <a:rPr lang="de-DE" dirty="0"/>
-              <a:t>, aber abgesehen vom exakten </a:t>
+              <a:t> </a:t>
+            </a:r>
+            <a:r>
+              <a:rPr lang="de-DE" dirty="0" err="1"/>
+              <a:t>the</a:t>
+            </a:r>
+            <a:r>
+              <a:rPr lang="de-DE" dirty="0"/>
+              <a:t> </a:t>
             </a:r>
             <a:r>
               <a:rPr lang="de-DE" dirty="0" err="1"/>
@@ -1640,7 +2070,23 @@
             </a:r>
             <a:r>
               <a:rPr lang="de-DE" dirty="0"/>
-              <a:t> sonst passend</a:t>
+              <a:t>; Beobachten ein und beidhändige </a:t>
+            </a:r>
+            <a:r>
+              <a:rPr lang="de-DE" dirty="0" err="1"/>
+              <a:t>interaktion</a:t>
+            </a:r>
+            <a:r>
+              <a:rPr lang="de-DE" dirty="0"/>
+              <a:t>, sowie „gleichzeitige einhändige </a:t>
+            </a:r>
+            <a:r>
+              <a:rPr lang="de-DE" dirty="0" err="1"/>
+              <a:t>interaktion</a:t>
+            </a:r>
+            <a:r>
+              <a:rPr lang="de-DE" dirty="0"/>
+              <a:t>“</a:t>
             </a:r>
           </a:p>
           <a:p>
@@ -1654,14 +2100,69 @@
               <a:buNone/>
             </a:pPr>
             <a:r>
+              <a:rPr lang="de-DE" dirty="0" err="1"/>
+              <a:t>Zuckerman</a:t>
+            </a:r>
+            <a:r>
               <a:rPr lang="de-DE" dirty="0"/>
-              <a:t>Keine signifikanten unterschiede in Nutzer </a:t>
+              <a:t>: vergleich GUI TUI für in </a:t>
             </a:r>
             <a:r>
               <a:rPr lang="de-DE" dirty="0" err="1"/>
-              <a:t>zufriedenheit</a:t>
-            </a:r>
-            <a:endParaRPr lang="de-DE" dirty="0"/>
+              <a:t>depth</a:t>
+            </a:r>
+            <a:r>
+              <a:rPr lang="de-DE" dirty="0"/>
+              <a:t> </a:t>
+            </a:r>
+            <a:r>
+              <a:rPr lang="de-DE" dirty="0" err="1"/>
+              <a:t>analyse</a:t>
+            </a:r>
+            <a:r>
+              <a:rPr lang="de-DE" dirty="0"/>
+              <a:t>, aber: auf eigener </a:t>
+            </a:r>
+            <a:r>
+              <a:rPr lang="de-DE" dirty="0" err="1"/>
+              <a:t>software</a:t>
+            </a:r>
+            <a:r>
+              <a:rPr lang="de-DE" dirty="0"/>
+              <a:t> für spezielle </a:t>
+            </a:r>
+            <a:r>
+              <a:rPr lang="de-DE" dirty="0" err="1"/>
+              <a:t>interaktion</a:t>
+            </a:r>
+            <a:r>
+              <a:rPr lang="de-DE" dirty="0"/>
+              <a:t>; GUI bessere Usability, TUI präferiert;  Liste 11 vorheriger arbeiten im </a:t>
+            </a:r>
+            <a:r>
+              <a:rPr lang="de-DE" dirty="0" err="1"/>
+              <a:t>bereich</a:t>
+            </a:r>
+            <a:r>
+              <a:rPr lang="de-DE" dirty="0"/>
+              <a:t> und kein vergleich </a:t>
+            </a:r>
+            <a:r>
+              <a:rPr lang="de-DE" dirty="0" err="1"/>
+              <a:t>Tui</a:t>
+            </a:r>
+            <a:r>
+              <a:rPr lang="de-DE" dirty="0"/>
+              <a:t> </a:t>
+            </a:r>
+            <a:r>
+              <a:rPr lang="de-DE" dirty="0" err="1"/>
+              <a:t>Tui</a:t>
+            </a:r>
+            <a:r>
+              <a:rPr lang="de-DE" dirty="0"/>
+              <a:t> gelistet</a:t>
+            </a:r>
           </a:p>
           <a:p>
             <a:pPr marL="0" lvl="0" indent="0" algn="l" rtl="0">
@@ -1675,70 +2176,55 @@
             </a:pPr>
             <a:r>
               <a:rPr lang="de-DE" dirty="0"/>
-              <a:t>ABER: einhändig effizienter</a:t>
-            </a:r>
-          </a:p>
-          <a:p>
-            <a:pPr marL="171450" lvl="0" indent="-171450" algn="l" rtl="0">
-              <a:spcBef>
-                <a:spcPts val="0"/>
-              </a:spcBef>
-              <a:spcAft>
-                <a:spcPts val="0"/>
-              </a:spcAft>
-              <a:buFont typeface="Wingdings" panose="05000000000000000000" pitchFamily="2" charset="2"/>
-              <a:buChar char="à"/>
-            </a:pPr>
-            <a:r>
-              <a:rPr lang="de-DE" dirty="0">
-                <a:sym typeface="Wingdings" panose="05000000000000000000" pitchFamily="2" charset="2"/>
-              </a:rPr>
-              <a:t>zeigt, dass insgesamt wenig auf den vergleich von TUIs mit anderen TUIs geachtet wird  schritt zurück zu den </a:t>
-            </a:r>
-            <a:r>
-              <a:rPr lang="de-DE" dirty="0" err="1">
-                <a:sym typeface="Wingdings" panose="05000000000000000000" pitchFamily="2" charset="2"/>
-              </a:rPr>
-              <a:t>grundlagen</a:t>
-            </a:r>
-            <a:r>
-              <a:rPr lang="de-DE" dirty="0">
-                <a:sym typeface="Wingdings" panose="05000000000000000000" pitchFamily="2" charset="2"/>
-              </a:rPr>
-              <a:t>, </a:t>
-            </a:r>
-            <a:r>
-              <a:rPr lang="de-DE" dirty="0" err="1">
-                <a:sym typeface="Wingdings" panose="05000000000000000000" pitchFamily="2" charset="2"/>
-              </a:rPr>
-              <a:t>strategien</a:t>
-            </a:r>
-            <a:r>
-              <a:rPr lang="de-DE" dirty="0">
-                <a:sym typeface="Wingdings" panose="05000000000000000000" pitchFamily="2" charset="2"/>
-              </a:rPr>
-              <a:t> für TUIs festhalten und dann vergleichen</a:t>
-            </a:r>
-          </a:p>
-          <a:p>
-            <a:pPr marL="171450" lvl="0" indent="-171450" algn="l" rtl="0">
-              <a:spcBef>
-                <a:spcPts val="0"/>
-              </a:spcBef>
-              <a:spcAft>
-                <a:spcPts val="0"/>
-              </a:spcAft>
-              <a:buFont typeface="Wingdings" panose="05000000000000000000" pitchFamily="2" charset="2"/>
-              <a:buChar char="à"/>
-            </a:pPr>
-            <a:endParaRPr dirty="0"/>
+              <a:t>Ma et al: Interaktion auf </a:t>
+            </a:r>
+            <a:r>
+              <a:rPr lang="de-DE" dirty="0" err="1"/>
+              <a:t>museumstischen</a:t>
+            </a:r>
+            <a:r>
+              <a:rPr lang="de-DE" dirty="0"/>
+              <a:t>, entweder </a:t>
+            </a:r>
+            <a:r>
+              <a:rPr lang="de-DE" dirty="0" err="1"/>
+              <a:t>software</a:t>
+            </a:r>
+            <a:r>
+              <a:rPr lang="de-DE" dirty="0"/>
+              <a:t> gerenderter ring oder aufgelegter </a:t>
+            </a:r>
+            <a:r>
+              <a:rPr lang="de-DE" dirty="0" err="1"/>
+              <a:t>holzringTUI</a:t>
+            </a:r>
+            <a:r>
+              <a:rPr lang="de-DE" dirty="0"/>
+              <a:t> </a:t>
+            </a:r>
+            <a:r>
+              <a:rPr lang="de-DE" dirty="0" err="1"/>
+              <a:t>affordet</a:t>
+            </a:r>
+            <a:r>
+              <a:rPr lang="de-DE" dirty="0"/>
+              <a:t> berühren und manipulieren besser, keine signifikanten </a:t>
+            </a:r>
+            <a:r>
+              <a:rPr lang="de-DE" dirty="0" err="1"/>
+              <a:t>ergebnisse</a:t>
+            </a:r>
+            <a:r>
+              <a:rPr lang="de-DE" dirty="0"/>
+              <a:t> außerhalb davon</a:t>
+            </a:r>
           </a:p>
         </p:txBody>
       </p:sp>
     </p:spTree>
     <p:extLst>
       <p:ext uri="{BB962C8B-B14F-4D97-AF65-F5344CB8AC3E}">
-        <p14:creationId xmlns:p14="http://schemas.microsoft.com/office/powerpoint/2010/main" val="3832958458"/>
+        <p14:creationId xmlns:p14="http://schemas.microsoft.com/office/powerpoint/2010/main" val="3548629303"/>
       </p:ext>
     </p:extLst>
   </p:cSld>
@@ -1748,12 +2234,12 @@
 </p:notes>
 </file>
 
-<file path=ppt/notesSlides/notesSlide7.xml><?xml version="1.0" encoding="utf-8"?>
-<p:notes xmlns:a="http://schemas.openxmlformats.org/drawingml/2006/main" xmlns:r="http://schemas.openxmlformats.org/officeDocument/2006/relationships" xmlns:p="http://schemas.openxmlformats.org/presentationml/2006/main">
+<file path=ppt/notesSlides/notesSlide8.xml><?xml version="1.0" encoding="utf-8"?>
+<p:notes xmlns:a="http://schemas.openxmlformats.org/drawingml/2006/main" xmlns:r="http://schemas.openxmlformats.org/officeDocument/2006/relationships" xmlns:p="http://schemas.openxmlformats.org/presentationml/2006/main" showMasterSp="0" showMasterPhAnim="0">
   <p:cSld>
     <p:spTree>
       <p:nvGrpSpPr>
-        <p:cNvPr id="1" name=""/>
+        <p:cNvPr id="1" name="Shape 295"/>
         <p:cNvGrpSpPr/>
         <p:nvPr/>
       </p:nvGrpSpPr>
@@ -1767,12 +2253,12 @@
       </p:grpSpPr>
       <p:sp>
         <p:nvSpPr>
-          <p:cNvPr id="2" name="Folienbildplatzhalter 1"/>
+          <p:cNvPr id="296" name="Google Shape;296;g5e8018bd06_4_51:notes"/>
           <p:cNvSpPr>
             <a:spLocks noGrp="1" noRot="1" noChangeAspect="1"/>
           </p:cNvSpPr>
           <p:nvPr>
-            <p:ph type="sldImg"/>
+            <p:ph type="sldImg" idx="2"/>
           </p:nvPr>
         </p:nvSpPr>
         <p:spPr>
@@ -1780,161 +2266,212 @@
             <a:off x="381000" y="685800"/>
             <a:ext cx="6096000" cy="3429000"/>
           </a:xfrm>
+          <a:custGeom>
+            <a:avLst/>
+            <a:gdLst/>
+            <a:ahLst/>
+            <a:cxnLst/>
+            <a:rect l="l" t="t" r="r" b="b"/>
+            <a:pathLst>
+              <a:path w="120000" h="120000" extrusionOk="0">
+                <a:moveTo>
+                  <a:pt x="0" y="0"/>
+                </a:moveTo>
+                <a:lnTo>
+                  <a:pt x="120000" y="0"/>
+                </a:lnTo>
+                <a:lnTo>
+                  <a:pt x="120000" y="120000"/>
+                </a:lnTo>
+                <a:lnTo>
+                  <a:pt x="0" y="120000"/>
+                </a:lnTo>
+                <a:close/>
+              </a:path>
+            </a:pathLst>
+          </a:custGeom>
         </p:spPr>
       </p:sp>
       <p:sp>
         <p:nvSpPr>
-          <p:cNvPr id="3" name="Notizenplatzhalter 2"/>
-          <p:cNvSpPr>
+          <p:cNvPr id="297" name="Google Shape;297;g5e8018bd06_4_51:notes"/>
+          <p:cNvSpPr txBox="1">
             <a:spLocks noGrp="1"/>
           </p:cNvSpPr>
           <p:nvPr>
             <p:ph type="body" idx="1"/>
           </p:nvPr>
         </p:nvSpPr>
-        <p:spPr/>
+        <p:spPr>
+          <a:xfrm>
+            <a:off x="685800" y="4343400"/>
+            <a:ext cx="5486400" cy="4114800"/>
+          </a:xfrm>
+          <a:prstGeom prst="rect">
+            <a:avLst/>
+          </a:prstGeom>
+        </p:spPr>
         <p:txBody>
-          <a:bodyPr/>
+          <a:bodyPr spcFirstLastPara="1" wrap="square" lIns="91425" tIns="91425" rIns="91425" bIns="91425" anchor="t" anchorCtr="0">
+            <a:noAutofit/>
+          </a:bodyPr>
           <a:lstStyle/>
           <a:p>
-            <a:pPr marL="457200" marR="0" lvl="0" indent="-298450" algn="l" defTabSz="914400" rtl="0" eaLnBrk="1" fontAlgn="auto" latinLnBrk="0" hangingPunct="1">
-              <a:lnSpc>
-                <a:spcPct val="100000"/>
-              </a:lnSpc>
-              <a:spcBef>
-                <a:spcPts val="0"/>
-              </a:spcBef>
-              <a:spcAft>
-                <a:spcPts val="0"/>
-              </a:spcAft>
-              <a:buClr>
-                <a:srgbClr val="000000"/>
-              </a:buClr>
-              <a:buSzPts val="1100"/>
-              <a:buFont typeface="Arial"/>
-              <a:buChar char="●"/>
-              <a:tabLst/>
-              <a:defRPr/>
+            <a:pPr marL="0" lvl="0" indent="0" algn="l" rtl="0">
+              <a:spcBef>
+                <a:spcPts val="0"/>
+              </a:spcBef>
+              <a:spcAft>
+                <a:spcPts val="0"/>
+              </a:spcAft>
+              <a:buNone/>
+            </a:pPr>
+            <a:r>
+              <a:rPr lang="de-DE" dirty="0"/>
+              <a:t>Fokus auf </a:t>
+            </a:r>
+            <a:r>
+              <a:rPr lang="de-DE" dirty="0" err="1"/>
+              <a:t>one-handed</a:t>
+            </a:r>
+            <a:r>
+              <a:rPr lang="de-DE" dirty="0"/>
+              <a:t> </a:t>
+            </a:r>
+            <a:r>
+              <a:rPr lang="de-DE" dirty="0" err="1"/>
+              <a:t>vs</a:t>
+            </a:r>
+            <a:r>
+              <a:rPr lang="de-DE" dirty="0"/>
+              <a:t> </a:t>
+            </a:r>
+            <a:r>
+              <a:rPr lang="de-DE" dirty="0" err="1"/>
+              <a:t>two</a:t>
+            </a:r>
+            <a:r>
+              <a:rPr lang="de-DE" dirty="0"/>
+              <a:t> </a:t>
+            </a:r>
+            <a:r>
+              <a:rPr lang="de-DE" dirty="0" err="1"/>
+              <a:t>handed</a:t>
+            </a:r>
+            <a:r>
+              <a:rPr lang="de-DE" dirty="0"/>
+              <a:t>, aber abgesehen vom exakten </a:t>
+            </a:r>
+            <a:r>
+              <a:rPr lang="de-DE" dirty="0" err="1"/>
+              <a:t>task</a:t>
+            </a:r>
+            <a:r>
+              <a:rPr lang="de-DE" dirty="0"/>
+              <a:t> sonst passend</a:t>
+            </a:r>
+          </a:p>
+          <a:p>
+            <a:pPr marL="0" lvl="0" indent="0" algn="l" rtl="0">
+              <a:spcBef>
+                <a:spcPts val="0"/>
+              </a:spcBef>
+              <a:spcAft>
+                <a:spcPts val="0"/>
+              </a:spcAft>
+              <a:buNone/>
+            </a:pPr>
+            <a:r>
+              <a:rPr lang="de-DE" dirty="0"/>
+              <a:t>Keine signifikanten unterschiede in Nutzer </a:t>
+            </a:r>
+            <a:r>
+              <a:rPr lang="de-DE" dirty="0" err="1"/>
+              <a:t>zufriedenheit</a:t>
+            </a:r>
+            <a:endParaRPr lang="de-DE" dirty="0"/>
+          </a:p>
+          <a:p>
+            <a:pPr marL="0" lvl="0" indent="0" algn="l" rtl="0">
+              <a:spcBef>
+                <a:spcPts val="0"/>
+              </a:spcBef>
+              <a:spcAft>
+                <a:spcPts val="0"/>
+              </a:spcAft>
+              <a:buNone/>
+            </a:pPr>
+            <a:r>
+              <a:rPr lang="de-DE" dirty="0"/>
+              <a:t>ABER: einhändig effizienter, 2h weniger </a:t>
+            </a:r>
+            <a:r>
+              <a:rPr lang="de-DE" dirty="0" err="1"/>
+              <a:t>fehler</a:t>
+            </a:r>
+            <a:endParaRPr lang="de-DE" dirty="0"/>
+          </a:p>
+          <a:p>
+            <a:pPr marL="171450" lvl="0" indent="-171450" algn="l" rtl="0">
+              <a:spcBef>
+                <a:spcPts val="0"/>
+              </a:spcBef>
+              <a:spcAft>
+                <a:spcPts val="0"/>
+              </a:spcAft>
+              <a:buFont typeface="Wingdings" panose="05000000000000000000" pitchFamily="2" charset="2"/>
+              <a:buChar char="à"/>
             </a:pPr>
             <a:r>
               <a:rPr lang="de-DE" dirty="0">
                 <a:sym typeface="Wingdings" panose="05000000000000000000" pitchFamily="2" charset="2"/>
               </a:rPr>
-              <a:t>Ansatz hier dann eben: ein einzelnes TUI mit allen </a:t>
+              <a:t>zeigt, dass insgesamt wenig auf den vergleich von TUIs mit anderen TUIs geachtet wird  schritt zurück zu den </a:t>
             </a:r>
             <a:r>
               <a:rPr lang="de-DE" dirty="0" err="1">
                 <a:sym typeface="Wingdings" panose="05000000000000000000" pitchFamily="2" charset="2"/>
               </a:rPr>
-              <a:t>funktionen</a:t>
+              <a:t>grundlagen</a:t>
             </a:r>
             <a:r>
               <a:rPr lang="de-DE" dirty="0">
                 <a:sym typeface="Wingdings" panose="05000000000000000000" pitchFamily="2" charset="2"/>
               </a:rPr>
-              <a:t> (durchgeben?) gegen viele (5) TUIs mit je einer </a:t>
+              <a:t>, </a:t>
             </a:r>
             <a:r>
               <a:rPr lang="de-DE" dirty="0" err="1">
                 <a:sym typeface="Wingdings" panose="05000000000000000000" pitchFamily="2" charset="2"/>
               </a:rPr>
-              <a:t>funktion</a:t>
-            </a:r>
-            <a:endParaRPr lang="de-DE" dirty="0">
-              <a:sym typeface="Wingdings" panose="05000000000000000000" pitchFamily="2" charset="2"/>
-            </a:endParaRPr>
-          </a:p>
-          <a:p>
-            <a:endParaRPr lang="de-DE" dirty="0"/>
+              <a:t>strategien</a:t>
+            </a:r>
+            <a:r>
+              <a:rPr lang="de-DE" dirty="0">
+                <a:sym typeface="Wingdings" panose="05000000000000000000" pitchFamily="2" charset="2"/>
+              </a:rPr>
+              <a:t> für TUIs festhalten und dann vergleichen</a:t>
+            </a:r>
+          </a:p>
+          <a:p>
+            <a:pPr marL="171450" lvl="0" indent="-171450" algn="l" rtl="0">
+              <a:spcBef>
+                <a:spcPts val="0"/>
+              </a:spcBef>
+              <a:spcAft>
+                <a:spcPts val="0"/>
+              </a:spcAft>
+              <a:buFont typeface="Wingdings" panose="05000000000000000000" pitchFamily="2" charset="2"/>
+              <a:buChar char="à"/>
+            </a:pPr>
+            <a:endParaRPr dirty="0"/>
           </a:p>
         </p:txBody>
       </p:sp>
     </p:spTree>
     <p:extLst>
       <p:ext uri="{BB962C8B-B14F-4D97-AF65-F5344CB8AC3E}">
-        <p14:creationId xmlns:p14="http://schemas.microsoft.com/office/powerpoint/2010/main" val="625239163"/>
-      </p:ext>
-    </p:extLst>
-  </p:cSld>
-  <p:clrMapOvr>
-    <a:masterClrMapping/>
-  </p:clrMapOvr>
-</p:notes>
-</file>
-
-<file path=ppt/notesSlides/notesSlide8.xml><?xml version="1.0" encoding="utf-8"?>
-<p:notes xmlns:a="http://schemas.openxmlformats.org/drawingml/2006/main" xmlns:r="http://schemas.openxmlformats.org/officeDocument/2006/relationships" xmlns:p="http://schemas.openxmlformats.org/presentationml/2006/main">
-  <p:cSld>
-    <p:spTree>
-      <p:nvGrpSpPr>
-        <p:cNvPr id="1" name=""/>
-        <p:cNvGrpSpPr/>
-        <p:nvPr/>
-      </p:nvGrpSpPr>
-      <p:grpSpPr>
-        <a:xfrm>
-          <a:off x="0" y="0"/>
-          <a:ext cx="0" cy="0"/>
-          <a:chOff x="0" y="0"/>
-          <a:chExt cx="0" cy="0"/>
-        </a:xfrm>
-      </p:grpSpPr>
-      <p:sp>
-        <p:nvSpPr>
-          <p:cNvPr id="2" name="Folienbildplatzhalter 1"/>
-          <p:cNvSpPr>
-            <a:spLocks noGrp="1" noRot="1" noChangeAspect="1"/>
-          </p:cNvSpPr>
-          <p:nvPr>
-            <p:ph type="sldImg"/>
-          </p:nvPr>
-        </p:nvSpPr>
-        <p:spPr>
-          <a:xfrm>
-            <a:off x="381000" y="685800"/>
-            <a:ext cx="6096000" cy="3429000"/>
-          </a:xfrm>
-        </p:spPr>
-      </p:sp>
-      <p:sp>
-        <p:nvSpPr>
-          <p:cNvPr id="3" name="Notizenplatzhalter 2"/>
-          <p:cNvSpPr>
-            <a:spLocks noGrp="1"/>
-          </p:cNvSpPr>
-          <p:nvPr>
-            <p:ph type="body" idx="1"/>
-          </p:nvPr>
-        </p:nvSpPr>
-        <p:spPr/>
-        <p:txBody>
-          <a:bodyPr/>
-          <a:lstStyle/>
-          <a:p>
-            <a:r>
-              <a:rPr lang="de-DE" dirty="0"/>
-              <a:t>M5-Stack: 32bit Mikrocontroller mit </a:t>
-            </a:r>
-            <a:r>
-              <a:rPr lang="de-DE" dirty="0" err="1"/>
-              <a:t>gehäuse</a:t>
-            </a:r>
-            <a:r>
-              <a:rPr lang="de-DE" dirty="0"/>
-              <a:t> und </a:t>
-            </a:r>
-            <a:r>
-              <a:rPr lang="de-DE" dirty="0" err="1"/>
-              <a:t>display</a:t>
-            </a:r>
-            <a:endParaRPr lang="de-DE" dirty="0"/>
-          </a:p>
-        </p:txBody>
-      </p:sp>
-    </p:spTree>
-    <p:extLst>
-      <p:ext uri="{BB962C8B-B14F-4D97-AF65-F5344CB8AC3E}">
-        <p14:creationId xmlns:p14="http://schemas.microsoft.com/office/powerpoint/2010/main" val="185102740"/>
+        <p14:creationId xmlns:p14="http://schemas.microsoft.com/office/powerpoint/2010/main" val="3832958458"/>
       </p:ext>
     </p:extLst>
   </p:cSld>
@@ -1993,294 +2530,54 @@
           <a:bodyPr/>
           <a:lstStyle/>
           <a:p>
-            <a:r>
-              <a:rPr lang="de-DE" dirty="0"/>
-              <a:t>Warum </a:t>
-            </a:r>
-            <a:r>
-              <a:rPr lang="de-DE" dirty="0" err="1"/>
-              <a:t>photosorting</a:t>
-            </a:r>
-            <a:r>
-              <a:rPr lang="de-DE" dirty="0"/>
-              <a:t>? Wird oft verwendet für den vergleich traditionelle </a:t>
-            </a:r>
-            <a:r>
-              <a:rPr lang="de-DE" dirty="0" err="1"/>
-              <a:t>vs</a:t>
-            </a:r>
-            <a:r>
-              <a:rPr lang="de-DE" dirty="0"/>
-              <a:t> neue </a:t>
-            </a:r>
-            <a:r>
-              <a:rPr lang="de-DE" dirty="0" err="1"/>
-              <a:t>interaktion</a:t>
-            </a:r>
-            <a:r>
-              <a:rPr lang="de-DE" dirty="0"/>
-              <a:t>;</a:t>
-            </a:r>
-          </a:p>
-          <a:p>
-            <a:r>
-              <a:rPr lang="de-DE" dirty="0"/>
-              <a:t>Problem: </a:t>
-            </a:r>
-            <a:r>
-              <a:rPr lang="de-DE" dirty="0" err="1"/>
-              <a:t>reproduzierbarkeit</a:t>
-            </a:r>
-            <a:r>
-              <a:rPr lang="de-DE" dirty="0"/>
-              <a:t>; unterschiedlich große </a:t>
-            </a:r>
-            <a:r>
-              <a:rPr lang="de-DE" dirty="0" err="1"/>
-              <a:t>sets</a:t>
-            </a:r>
-            <a:r>
-              <a:rPr lang="de-DE" dirty="0"/>
-              <a:t>, mitgebrachte </a:t>
-            </a:r>
-            <a:r>
-              <a:rPr lang="de-DE" dirty="0" err="1"/>
-              <a:t>sets</a:t>
-            </a:r>
-            <a:r>
-              <a:rPr lang="de-DE" dirty="0"/>
-              <a:t> der </a:t>
-            </a:r>
-            <a:r>
-              <a:rPr lang="de-DE" dirty="0" err="1"/>
-              <a:t>teilnehmer</a:t>
-            </a:r>
-            <a:r>
-              <a:rPr lang="de-DE" dirty="0"/>
-              <a:t>, unterschiedliche </a:t>
-            </a:r>
-            <a:r>
-              <a:rPr lang="de-DE" dirty="0" err="1"/>
-              <a:t>kategorien</a:t>
-            </a:r>
-            <a:endParaRPr lang="de-DE" dirty="0"/>
-          </a:p>
-          <a:p>
-            <a:pPr marL="457200" indent="-298450">
-              <a:buFont typeface="Wingdings" panose="05000000000000000000" pitchFamily="2" charset="2"/>
-              <a:buChar char="à"/>
+            <a:pPr marL="457200" marR="0" lvl="0" indent="-298450" algn="l" defTabSz="914400" rtl="0" eaLnBrk="1" fontAlgn="auto" latinLnBrk="0" hangingPunct="1">
+              <a:lnSpc>
+                <a:spcPct val="100000"/>
+              </a:lnSpc>
+              <a:spcBef>
+                <a:spcPts val="0"/>
+              </a:spcBef>
+              <a:spcAft>
+                <a:spcPts val="0"/>
+              </a:spcAft>
+              <a:buClr>
+                <a:srgbClr val="000000"/>
+              </a:buClr>
+              <a:buSzPts val="1100"/>
+              <a:buFont typeface="Arial"/>
+              <a:buChar char="●"/>
+              <a:tabLst/>
+              <a:defRPr/>
             </a:pPr>
+            <a:r>
+              <a:rPr lang="de-DE" dirty="0">
+                <a:sym typeface="Wingdings" panose="05000000000000000000" pitchFamily="2" charset="2"/>
+              </a:rPr>
+              <a:t>Ansatz hier dann eben: ein einzelnes TUI mit allen </a:t>
+            </a:r>
             <a:r>
               <a:rPr lang="de-DE" dirty="0" err="1">
                 <a:sym typeface="Wingdings" panose="05000000000000000000" pitchFamily="2" charset="2"/>
               </a:rPr>
-              <a:t>Photoset</a:t>
+              <a:t>funktionen</a:t>
             </a:r>
             <a:r>
               <a:rPr lang="de-DE" dirty="0">
                 <a:sym typeface="Wingdings" panose="05000000000000000000" pitchFamily="2" charset="2"/>
               </a:rPr>
-              <a:t> mit reproduzierbaren </a:t>
+              <a:t> (durchgeben?) gegen viele (5) TUIs mit je einer </a:t>
             </a:r>
             <a:r>
               <a:rPr lang="de-DE" dirty="0" err="1">
                 <a:sym typeface="Wingdings" panose="05000000000000000000" pitchFamily="2" charset="2"/>
               </a:rPr>
-              <a:t>ergebnissen</a:t>
+              <a:t>funktion</a:t>
             </a:r>
             <a:endParaRPr lang="de-DE" dirty="0">
               <a:sym typeface="Wingdings" panose="05000000000000000000" pitchFamily="2" charset="2"/>
             </a:endParaRPr>
           </a:p>
           <a:p>
-            <a:pPr marL="457200" indent="-298450">
-              <a:buFont typeface="Wingdings" panose="05000000000000000000" pitchFamily="2" charset="2"/>
-              <a:buChar char="à"/>
-            </a:pPr>
-            <a:endParaRPr lang="de-DE" dirty="0"/>
-          </a:p>
-          <a:p>
-            <a:r>
-              <a:rPr lang="de-DE" dirty="0" err="1"/>
-              <a:t>Within</a:t>
-            </a:r>
-            <a:r>
-              <a:rPr lang="de-DE" dirty="0"/>
-              <a:t> </a:t>
-            </a:r>
-            <a:r>
-              <a:rPr lang="de-DE" dirty="0" err="1"/>
-              <a:t>subject</a:t>
-            </a:r>
-            <a:r>
-              <a:rPr lang="de-DE" dirty="0"/>
-              <a:t> weil solidere Daten, </a:t>
-            </a:r>
-            <a:r>
-              <a:rPr lang="de-DE" dirty="0" err="1"/>
-              <a:t>einfluss</a:t>
-            </a:r>
-            <a:r>
-              <a:rPr lang="de-DE" dirty="0"/>
-              <a:t> von </a:t>
-            </a:r>
-            <a:r>
-              <a:rPr lang="de-DE" dirty="0" err="1"/>
-              <a:t>anchoring</a:t>
-            </a:r>
-            <a:r>
-              <a:rPr lang="de-DE" dirty="0"/>
-              <a:t> des ersten </a:t>
-            </a:r>
-            <a:r>
-              <a:rPr lang="de-DE" dirty="0" err="1"/>
-              <a:t>durchlaufs</a:t>
-            </a:r>
-            <a:r>
-              <a:rPr lang="de-DE" dirty="0"/>
-              <a:t>?, direkte </a:t>
-            </a:r>
-            <a:r>
-              <a:rPr lang="de-DE" dirty="0" err="1"/>
-              <a:t>präferenzen</a:t>
-            </a:r>
-            <a:r>
-              <a:rPr lang="de-DE" dirty="0"/>
-              <a:t>, vergleich der </a:t>
-            </a:r>
-            <a:r>
-              <a:rPr lang="de-DE" dirty="0" err="1"/>
-              <a:t>cognitive</a:t>
-            </a:r>
-            <a:r>
-              <a:rPr lang="de-DE" dirty="0"/>
-              <a:t> </a:t>
-            </a:r>
-            <a:r>
-              <a:rPr lang="de-DE" dirty="0" err="1"/>
-              <a:t>load</a:t>
-            </a:r>
-            <a:endParaRPr lang="de-DE" dirty="0"/>
-          </a:p>
-          <a:p>
-            <a:r>
-              <a:rPr lang="de-DE" dirty="0"/>
-              <a:t>Interview aufgeteilt zur </a:t>
-            </a:r>
-            <a:r>
-              <a:rPr lang="de-DE" dirty="0" err="1"/>
-              <a:t>entlastung</a:t>
-            </a:r>
-            <a:r>
-              <a:rPr lang="de-DE" dirty="0"/>
-              <a:t> des </a:t>
-            </a:r>
-            <a:r>
-              <a:rPr lang="de-DE" dirty="0" err="1"/>
-              <a:t>kurzzeitgedächtnisses</a:t>
-            </a:r>
-            <a:r>
-              <a:rPr lang="de-DE" dirty="0"/>
-              <a:t>. Guter plan? Schlechter plan?</a:t>
-            </a:r>
-          </a:p>
-          <a:p>
-            <a:r>
-              <a:rPr lang="de-DE" dirty="0" err="1"/>
-              <a:t>Nasa</a:t>
-            </a:r>
-            <a:r>
-              <a:rPr lang="de-DE" dirty="0"/>
-              <a:t> TLX 1x oder 2x</a:t>
-            </a:r>
-          </a:p>
-          <a:p>
-            <a:r>
-              <a:rPr lang="de-DE" dirty="0"/>
-              <a:t>Video, </a:t>
-            </a:r>
-            <a:r>
-              <a:rPr lang="de-DE" dirty="0" err="1"/>
-              <a:t>interviews</a:t>
-            </a:r>
-            <a:r>
-              <a:rPr lang="de-DE" dirty="0"/>
-              <a:t> und logs zur </a:t>
-            </a:r>
-            <a:r>
-              <a:rPr lang="de-DE" dirty="0" err="1"/>
-              <a:t>bestimmung</a:t>
-            </a:r>
-            <a:r>
-              <a:rPr lang="de-DE" dirty="0"/>
-              <a:t> von </a:t>
-            </a:r>
-            <a:r>
-              <a:rPr lang="de-DE" dirty="0" err="1"/>
-              <a:t>strategien</a:t>
-            </a:r>
-            <a:r>
-              <a:rPr lang="de-DE" dirty="0"/>
-              <a:t>, </a:t>
-            </a:r>
-            <a:r>
-              <a:rPr lang="de-DE" dirty="0" err="1"/>
-              <a:t>nasatlx</a:t>
-            </a:r>
-            <a:r>
-              <a:rPr lang="de-DE" dirty="0"/>
-              <a:t> und </a:t>
-            </a:r>
-            <a:r>
-              <a:rPr lang="de-DE" dirty="0" err="1"/>
-              <a:t>interviews</a:t>
-            </a:r>
-            <a:r>
-              <a:rPr lang="de-DE" dirty="0"/>
-              <a:t> zur </a:t>
-            </a:r>
-            <a:r>
-              <a:rPr lang="de-DE" dirty="0" err="1"/>
-              <a:t>bewertung</a:t>
-            </a:r>
-            <a:r>
-              <a:rPr lang="de-DE" dirty="0"/>
-              <a:t> von </a:t>
-            </a:r>
-            <a:r>
-              <a:rPr lang="de-DE" dirty="0" err="1"/>
-              <a:t>strategien</a:t>
-            </a:r>
-            <a:endParaRPr lang="de-DE" dirty="0"/>
-          </a:p>
-          <a:p>
-            <a:pPr marL="158750" indent="0">
-              <a:buNone/>
-            </a:pPr>
-            <a:r>
-              <a:rPr lang="de-DE" dirty="0">
-                <a:sym typeface="Wingdings" panose="05000000000000000000" pitchFamily="2" charset="2"/>
-              </a:rPr>
-              <a:t> Strategien bestimmen aufgrund vom vorgehen, </a:t>
-            </a:r>
-            <a:r>
-              <a:rPr lang="de-DE" dirty="0" err="1">
-                <a:sym typeface="Wingdings" panose="05000000000000000000" pitchFamily="2" charset="2"/>
-              </a:rPr>
-              <a:t>händigkeit</a:t>
-            </a:r>
-            <a:r>
-              <a:rPr lang="de-DE" dirty="0">
-                <a:sym typeface="Wingdings" panose="05000000000000000000" pitchFamily="2" charset="2"/>
-              </a:rPr>
-              <a:t>, </a:t>
-            </a:r>
-            <a:r>
-              <a:rPr lang="de-DE" dirty="0" err="1">
-                <a:sym typeface="Wingdings" panose="05000000000000000000" pitchFamily="2" charset="2"/>
-              </a:rPr>
-              <a:t>prioritäten</a:t>
-            </a:r>
             <a:endParaRPr lang="de-DE" dirty="0"/>
           </a:p>
         </p:txBody>
@@ -2288,7 +2585,7 @@
     </p:spTree>
     <p:extLst>
       <p:ext uri="{BB962C8B-B14F-4D97-AF65-F5344CB8AC3E}">
-        <p14:creationId xmlns:p14="http://schemas.microsoft.com/office/powerpoint/2010/main" val="4044334140"/>
+        <p14:creationId xmlns:p14="http://schemas.microsoft.com/office/powerpoint/2010/main" val="625239163"/>
       </p:ext>
     </p:extLst>
   </p:cSld>
@@ -15608,7 +15905,7 @@
           <p:nvPr/>
         </p:nvPicPr>
         <p:blipFill>
-          <a:blip r:embed="rId2"/>
+          <a:blip r:embed="rId3"/>
           <a:stretch>
             <a:fillRect/>
           </a:stretch>
@@ -15638,7 +15935,7 @@
           <p:nvPr/>
         </p:nvPicPr>
         <p:blipFill>
-          <a:blip r:embed="rId3"/>
+          <a:blip r:embed="rId4"/>
           <a:stretch>
             <a:fillRect/>
           </a:stretch>
@@ -15837,7 +16134,7 @@
               <a:buChar char="•"/>
             </a:pPr>
             <a:r>
-              <a:rPr lang="de-DE" sz="1400" dirty="0">
+              <a:rPr lang="de-DE" sz="1400" dirty="0" err="1">
                 <a:solidFill>
                   <a:srgbClr val="000000"/>
                 </a:solidFill>
@@ -15845,7 +16142,40 @@
                   <a:srgbClr val="FFFFFF"/>
                 </a:highlight>
               </a:rPr>
-              <a:t>[5] Touch </a:t>
+              <a:t>Tuddenham</a:t>
+            </a:r>
+            <a:r>
+              <a:rPr lang="de-DE" sz="1400" dirty="0">
+                <a:solidFill>
+                  <a:srgbClr val="000000"/>
+                </a:solidFill>
+                <a:highlight>
+                  <a:srgbClr val="FFFFFF"/>
+                </a:highlight>
+              </a:rPr>
+              <a:t>, Kirk &amp; </a:t>
+            </a:r>
+            <a:r>
+              <a:rPr lang="de-DE" sz="1400" dirty="0" err="1">
+                <a:solidFill>
+                  <a:srgbClr val="000000"/>
+                </a:solidFill>
+                <a:highlight>
+                  <a:srgbClr val="FFFFFF"/>
+                </a:highlight>
+              </a:rPr>
+              <a:t>Izadi</a:t>
+            </a:r>
+            <a:r>
+              <a:rPr lang="de-DE" sz="1400" dirty="0">
+                <a:solidFill>
+                  <a:srgbClr val="000000"/>
+                </a:solidFill>
+                <a:highlight>
+                  <a:srgbClr val="FFFFFF"/>
+                </a:highlight>
+              </a:rPr>
+              <a:t> [5] Touch </a:t>
             </a:r>
             <a:r>
               <a:rPr lang="de-DE" sz="1400" dirty="0" err="1">
@@ -15898,7 +16228,7 @@
               <a:buChar char="•"/>
             </a:pPr>
             <a:r>
-              <a:rPr lang="de-DE" sz="1400" dirty="0">
+              <a:rPr lang="de-DE" sz="1400" dirty="0" err="1">
                 <a:solidFill>
                   <a:srgbClr val="000000"/>
                 </a:solidFill>
@@ -15906,7 +16236,18 @@
                   <a:srgbClr val="FFFFFF"/>
                 </a:highlight>
               </a:rPr>
-              <a:t>[6] GUI </a:t>
+              <a:t>Zuckerman</a:t>
+            </a:r>
+            <a:r>
+              <a:rPr lang="de-DE" sz="1400" dirty="0">
+                <a:solidFill>
+                  <a:srgbClr val="000000"/>
+                </a:solidFill>
+                <a:highlight>
+                  <a:srgbClr val="FFFFFF"/>
+                </a:highlight>
+              </a:rPr>
+              <a:t> &amp; Gal-Oz [6] GUI </a:t>
             </a:r>
             <a:r>
               <a:rPr lang="de-DE" sz="1400" dirty="0" err="1">
@@ -15945,7 +16286,7 @@
                   <a:srgbClr val="FFFFFF"/>
                 </a:highlight>
               </a:rPr>
-              <a:t>[7] TUI </a:t>
+              <a:t>Ma et al. [7] TUI </a:t>
             </a:r>
             <a:r>
               <a:rPr lang="de-DE" sz="1400" dirty="0" err="1">

</xml_diff>